<commit_message>
exported with all steps
</commit_message>
<xml_diff>
--- a/lectures/13.1-3/lecture13.1.pptx
+++ b/lectures/13.1-3/lecture13.1.pptx
@@ -210,7 +210,7 @@
           <a:p>
             <a:fld id="{248031C6-E4B0-0444-A4A8-9CCE96EC2C9C}" type="datetimeFigureOut">
               <a:rPr lang="en-GB" smtClean="0"/>
-              <a:t>09/12/2019</a:t>
+              <a:t>12/12/2019</a:t>
             </a:fld>
             <a:endParaRPr lang="en-GB"/>
           </a:p>
@@ -627,7 +627,7 @@
           <a:p>
             <a:fld id="{66665395-52C5-5E4B-BB20-CD4E0BBC9899}" type="datetimeFigureOut">
               <a:rPr lang="en-GB" smtClean="0"/>
-              <a:t>09/12/2019</a:t>
+              <a:t>12/12/2019</a:t>
             </a:fld>
             <a:endParaRPr lang="en-GB"/>
           </a:p>
@@ -827,7 +827,7 @@
           <a:p>
             <a:fld id="{66665395-52C5-5E4B-BB20-CD4E0BBC9899}" type="datetimeFigureOut">
               <a:rPr lang="en-GB" smtClean="0"/>
-              <a:t>09/12/2019</a:t>
+              <a:t>12/12/2019</a:t>
             </a:fld>
             <a:endParaRPr lang="en-GB"/>
           </a:p>
@@ -1037,7 +1037,7 @@
           <a:p>
             <a:fld id="{66665395-52C5-5E4B-BB20-CD4E0BBC9899}" type="datetimeFigureOut">
               <a:rPr lang="en-GB" smtClean="0"/>
-              <a:t>09/12/2019</a:t>
+              <a:t>12/12/2019</a:t>
             </a:fld>
             <a:endParaRPr lang="en-GB"/>
           </a:p>
@@ -1237,7 +1237,7 @@
           <a:p>
             <a:fld id="{66665395-52C5-5E4B-BB20-CD4E0BBC9899}" type="datetimeFigureOut">
               <a:rPr lang="en-GB" smtClean="0"/>
-              <a:t>09/12/2019</a:t>
+              <a:t>12/12/2019</a:t>
             </a:fld>
             <a:endParaRPr lang="en-GB"/>
           </a:p>
@@ -1513,7 +1513,7 @@
           <a:p>
             <a:fld id="{66665395-52C5-5E4B-BB20-CD4E0BBC9899}" type="datetimeFigureOut">
               <a:rPr lang="en-GB" smtClean="0"/>
-              <a:t>09/12/2019</a:t>
+              <a:t>12/12/2019</a:t>
             </a:fld>
             <a:endParaRPr lang="en-GB"/>
           </a:p>
@@ -1781,7 +1781,7 @@
           <a:p>
             <a:fld id="{66665395-52C5-5E4B-BB20-CD4E0BBC9899}" type="datetimeFigureOut">
               <a:rPr lang="en-GB" smtClean="0"/>
-              <a:t>09/12/2019</a:t>
+              <a:t>12/12/2019</a:t>
             </a:fld>
             <a:endParaRPr lang="en-GB"/>
           </a:p>
@@ -2196,7 +2196,7 @@
           <a:p>
             <a:fld id="{66665395-52C5-5E4B-BB20-CD4E0BBC9899}" type="datetimeFigureOut">
               <a:rPr lang="en-GB" smtClean="0"/>
-              <a:t>09/12/2019</a:t>
+              <a:t>12/12/2019</a:t>
             </a:fld>
             <a:endParaRPr lang="en-GB"/>
           </a:p>
@@ -2338,7 +2338,7 @@
           <a:p>
             <a:fld id="{66665395-52C5-5E4B-BB20-CD4E0BBC9899}" type="datetimeFigureOut">
               <a:rPr lang="en-GB" smtClean="0"/>
-              <a:t>09/12/2019</a:t>
+              <a:t>12/12/2019</a:t>
             </a:fld>
             <a:endParaRPr lang="en-GB"/>
           </a:p>
@@ -2451,7 +2451,7 @@
           <a:p>
             <a:fld id="{66665395-52C5-5E4B-BB20-CD4E0BBC9899}" type="datetimeFigureOut">
               <a:rPr lang="en-GB" smtClean="0"/>
-              <a:t>09/12/2019</a:t>
+              <a:t>12/12/2019</a:t>
             </a:fld>
             <a:endParaRPr lang="en-GB"/>
           </a:p>
@@ -2764,7 +2764,7 @@
           <a:p>
             <a:fld id="{66665395-52C5-5E4B-BB20-CD4E0BBC9899}" type="datetimeFigureOut">
               <a:rPr lang="en-GB" smtClean="0"/>
-              <a:t>09/12/2019</a:t>
+              <a:t>12/12/2019</a:t>
             </a:fld>
             <a:endParaRPr lang="en-GB"/>
           </a:p>
@@ -3053,7 +3053,7 @@
           <a:p>
             <a:fld id="{66665395-52C5-5E4B-BB20-CD4E0BBC9899}" type="datetimeFigureOut">
               <a:rPr lang="en-GB" smtClean="0"/>
-              <a:t>09/12/2019</a:t>
+              <a:t>12/12/2019</a:t>
             </a:fld>
             <a:endParaRPr lang="en-GB"/>
           </a:p>
@@ -3296,7 +3296,7 @@
           <a:p>
             <a:fld id="{66665395-52C5-5E4B-BB20-CD4E0BBC9899}" type="datetimeFigureOut">
               <a:rPr lang="en-GB" smtClean="0"/>
-              <a:t>09/12/2019</a:t>
+              <a:t>12/12/2019</a:t>
             </a:fld>
             <a:endParaRPr lang="en-GB"/>
           </a:p>
@@ -12784,7 +12784,15 @@
             </a:pPr>
             <a:r>
               <a:rPr lang="da-DK" sz="2600" dirty="0"/>
-              <a:t>Dette er et spil for to personer, der kan spilles med papir og blyant. Der spilles på fire plader, to for hver spiller, og hver plade er inddelt i 10x10 felter. Hvert felt identificeres vha. dets række og søjle nummer.</a:t>
+              <a:t>Dette er et spil for to personer, der kan spilles med papir og blyant. Der spilles på fire plader, to for hver spiller, og hver plade er inddelt i 10x10 felter. Hvert felt identificeres vha. </a:t>
+            </a:r>
+            <a:r>
+              <a:rPr lang="da-DK" sz="2600"/>
+              <a:t>dets række- </a:t>
+            </a:r>
+            <a:r>
+              <a:rPr lang="da-DK" sz="2600" dirty="0"/>
+              <a:t>og søjle nummer.</a:t>
             </a:r>
           </a:p>
           <a:p>

</xml_diff>